<commit_message>
update slides with weight=max(w_i)
</commit_message>
<xml_diff>
--- a/scripts/manuscript/update_202508xx.pptx
+++ b/scripts/manuscript/update_202508xx.pptx
@@ -220,7 +220,7 @@
           <a:p>
             <a:fld id="{980A3329-A5D8-5A45-82D1-AA63529B0F9F}" type="datetimeFigureOut">
               <a:rPr lang="en-US" smtClean="0"/>
-              <a:t>7/15/25</a:t>
+              <a:t>7/19/25</a:t>
             </a:fld>
             <a:endParaRPr lang="en-US"/>
           </a:p>
@@ -634,7 +634,7 @@
           <a:p>
             <a:fld id="{8B87CF90-2037-9148-815D-49A77E793563}" type="datetimeFigureOut">
               <a:rPr lang="en-US" smtClean="0"/>
-              <a:t>7/15/25</a:t>
+              <a:t>7/19/25</a:t>
             </a:fld>
             <a:endParaRPr lang="en-US"/>
           </a:p>
@@ -832,7 +832,7 @@
           <a:p>
             <a:fld id="{8B87CF90-2037-9148-815D-49A77E793563}" type="datetimeFigureOut">
               <a:rPr lang="en-US" smtClean="0"/>
-              <a:t>7/15/25</a:t>
+              <a:t>7/19/25</a:t>
             </a:fld>
             <a:endParaRPr lang="en-US"/>
           </a:p>
@@ -1040,7 +1040,7 @@
           <a:p>
             <a:fld id="{8B87CF90-2037-9148-815D-49A77E793563}" type="datetimeFigureOut">
               <a:rPr lang="en-US" smtClean="0"/>
-              <a:t>7/15/25</a:t>
+              <a:t>7/19/25</a:t>
             </a:fld>
             <a:endParaRPr lang="en-US"/>
           </a:p>
@@ -1238,7 +1238,7 @@
           <a:p>
             <a:fld id="{8B87CF90-2037-9148-815D-49A77E793563}" type="datetimeFigureOut">
               <a:rPr lang="en-US" smtClean="0"/>
-              <a:t>7/15/25</a:t>
+              <a:t>7/19/25</a:t>
             </a:fld>
             <a:endParaRPr lang="en-US"/>
           </a:p>
@@ -1513,7 +1513,7 @@
           <a:p>
             <a:fld id="{8B87CF90-2037-9148-815D-49A77E793563}" type="datetimeFigureOut">
               <a:rPr lang="en-US" smtClean="0"/>
-              <a:t>7/15/25</a:t>
+              <a:t>7/19/25</a:t>
             </a:fld>
             <a:endParaRPr lang="en-US"/>
           </a:p>
@@ -1778,7 +1778,7 @@
           <a:p>
             <a:fld id="{8B87CF90-2037-9148-815D-49A77E793563}" type="datetimeFigureOut">
               <a:rPr lang="en-US" smtClean="0"/>
-              <a:t>7/15/25</a:t>
+              <a:t>7/19/25</a:t>
             </a:fld>
             <a:endParaRPr lang="en-US"/>
           </a:p>
@@ -2190,7 +2190,7 @@
           <a:p>
             <a:fld id="{8B87CF90-2037-9148-815D-49A77E793563}" type="datetimeFigureOut">
               <a:rPr lang="en-US" smtClean="0"/>
-              <a:t>7/15/25</a:t>
+              <a:t>7/19/25</a:t>
             </a:fld>
             <a:endParaRPr lang="en-US"/>
           </a:p>
@@ -2331,7 +2331,7 @@
           <a:p>
             <a:fld id="{8B87CF90-2037-9148-815D-49A77E793563}" type="datetimeFigureOut">
               <a:rPr lang="en-US" smtClean="0"/>
-              <a:t>7/15/25</a:t>
+              <a:t>7/19/25</a:t>
             </a:fld>
             <a:endParaRPr lang="en-US"/>
           </a:p>
@@ -2444,7 +2444,7 @@
           <a:p>
             <a:fld id="{8B87CF90-2037-9148-815D-49A77E793563}" type="datetimeFigureOut">
               <a:rPr lang="en-US" smtClean="0"/>
-              <a:t>7/15/25</a:t>
+              <a:t>7/19/25</a:t>
             </a:fld>
             <a:endParaRPr lang="en-US"/>
           </a:p>
@@ -2755,7 +2755,7 @@
           <a:p>
             <a:fld id="{8B87CF90-2037-9148-815D-49A77E793563}" type="datetimeFigureOut">
               <a:rPr lang="en-US" smtClean="0"/>
-              <a:t>7/15/25</a:t>
+              <a:t>7/19/25</a:t>
             </a:fld>
             <a:endParaRPr lang="en-US"/>
           </a:p>
@@ -3043,7 +3043,7 @@
           <a:p>
             <a:fld id="{8B87CF90-2037-9148-815D-49A77E793563}" type="datetimeFigureOut">
               <a:rPr lang="en-US" smtClean="0"/>
-              <a:t>7/15/25</a:t>
+              <a:t>7/19/25</a:t>
             </a:fld>
             <a:endParaRPr lang="en-US"/>
           </a:p>
@@ -3284,7 +3284,7 @@
           <a:p>
             <a:fld id="{8B87CF90-2037-9148-815D-49A77E793563}" type="datetimeFigureOut">
               <a:rPr lang="en-US" smtClean="0"/>
-              <a:t>7/15/25</a:t>
+              <a:t>7/19/25</a:t>
             </a:fld>
             <a:endParaRPr lang="en-US"/>
           </a:p>
@@ -3848,7 +3848,7 @@
         <p:spPr>
           <a:xfrm>
             <a:off x="487325" y="2422405"/>
-            <a:ext cx="1554126" cy="369332"/>
+            <a:ext cx="1554126" cy="646331"/>
           </a:xfrm>
           <a:prstGeom prst="rect">
             <a:avLst/>
@@ -3866,6 +3866,16 @@
               <a:t>SIR-1S: (26.0)</a:t>
             </a:r>
           </a:p>
+          <a:p>
+            <a:r>
+              <a:rPr lang="en-US" dirty="0">
+                <a:solidFill>
+                  <a:srgbClr val="FF0000"/>
+                </a:solidFill>
+              </a:rPr>
+              <a:t>(39.1)</a:t>
+            </a:r>
+          </a:p>
         </p:txBody>
       </p:sp>
       <p:sp>
@@ -3883,7 +3893,7 @@
         <p:spPr>
           <a:xfrm>
             <a:off x="487324" y="4074970"/>
-            <a:ext cx="1650581" cy="369332"/>
+            <a:ext cx="1650581" cy="646331"/>
           </a:xfrm>
           <a:prstGeom prst="rect">
             <a:avLst/>
@@ -3901,6 +3911,16 @@
               <a:t>SIR-2S: (21.3)</a:t>
             </a:r>
           </a:p>
+          <a:p>
+            <a:r>
+              <a:rPr lang="en-US" dirty="0">
+                <a:solidFill>
+                  <a:srgbClr val="FF0000"/>
+                </a:solidFill>
+              </a:rPr>
+              <a:t>(37.0)</a:t>
+            </a:r>
+          </a:p>
         </p:txBody>
       </p:sp>
       <p:sp>
@@ -3918,7 +3938,7 @@
         <p:spPr>
           <a:xfrm>
             <a:off x="487325" y="5831516"/>
-            <a:ext cx="1554126" cy="369332"/>
+            <a:ext cx="1554126" cy="646331"/>
           </a:xfrm>
           <a:prstGeom prst="rect">
             <a:avLst/>
@@ -3934,6 +3954,16 @@
             <a:r>
               <a:rPr lang="en-US" dirty="0"/>
               <a:t>SIR-3S: (21.1)</a:t>
+            </a:r>
+          </a:p>
+          <a:p>
+            <a:r>
+              <a:rPr lang="en-US" dirty="0">
+                <a:solidFill>
+                  <a:srgbClr val="FF0000"/>
+                </a:solidFill>
+              </a:rPr>
+              <a:t>(37.1)</a:t>
             </a:r>
           </a:p>
         </p:txBody>
@@ -4000,41 +4030,6 @@
           </a:prstGeom>
         </p:spPr>
       </p:pic>
-      <p:sp>
-        <p:nvSpPr>
-          <p:cNvPr id="22" name="TextBox 21">
-            <a:extLst>
-              <a:ext uri="{FF2B5EF4-FFF2-40B4-BE49-F238E27FC236}">
-                <a16:creationId xmlns:a16="http://schemas.microsoft.com/office/drawing/2014/main" id="{AF825E15-9650-44D9-2CD9-EBAD198D692B}"/>
-              </a:ext>
-            </a:extLst>
-          </p:cNvPr>
-          <p:cNvSpPr txBox="1"/>
-          <p:nvPr/>
-        </p:nvSpPr>
-        <p:spPr>
-          <a:xfrm>
-            <a:off x="443022" y="1708588"/>
-            <a:ext cx="1394638" cy="646331"/>
-          </a:xfrm>
-          <a:prstGeom prst="rect">
-            <a:avLst/>
-          </a:prstGeom>
-          <a:noFill/>
-        </p:spPr>
-        <p:txBody>
-          <a:bodyPr wrap="square" rtlCol="0">
-            <a:spAutoFit/>
-          </a:bodyPr>
-          <a:lstStyle/>
-          <a:p>
-            <a:r>
-              <a:rPr lang="en-US" dirty="0"/>
-              <a:t>WIS score 2014-2015</a:t>
-            </a:r>
-          </a:p>
-        </p:txBody>
-      </p:sp>
       <p:pic>
         <p:nvPicPr>
           <p:cNvPr id="4" name="Picture 3">
@@ -4233,6 +4228,51 @@
             <a:r>
               <a:rPr lang="en-US" dirty="0"/>
               <a:t> = [0.02, 0.20, 2.78]</a:t>
+            </a:r>
+          </a:p>
+        </p:txBody>
+      </p:sp>
+      <p:sp>
+        <p:nvSpPr>
+          <p:cNvPr id="3" name="TextBox 2">
+            <a:extLst>
+              <a:ext uri="{FF2B5EF4-FFF2-40B4-BE49-F238E27FC236}">
+                <a16:creationId xmlns:a16="http://schemas.microsoft.com/office/drawing/2014/main" id="{5F4BAF1F-A0F8-2A47-0FDF-595AF21644AB}"/>
+              </a:ext>
+            </a:extLst>
+          </p:cNvPr>
+          <p:cNvSpPr txBox="1"/>
+          <p:nvPr/>
+        </p:nvSpPr>
+        <p:spPr>
+          <a:xfrm>
+            <a:off x="443858" y="1460188"/>
+            <a:ext cx="1394638" cy="923330"/>
+          </a:xfrm>
+          <a:prstGeom prst="rect">
+            <a:avLst/>
+          </a:prstGeom>
+          <a:noFill/>
+        </p:spPr>
+        <p:txBody>
+          <a:bodyPr wrap="square" rtlCol="0">
+            <a:spAutoFit/>
+          </a:bodyPr>
+          <a:lstStyle/>
+          <a:p>
+            <a:r>
+              <a:rPr lang="en-US" dirty="0"/>
+              <a:t>WIS score 2014-2015</a:t>
+            </a:r>
+          </a:p>
+          <a:p>
+            <a:r>
+              <a:rPr lang="en-US" dirty="0">
+                <a:solidFill>
+                  <a:srgbClr val="FF0000"/>
+                </a:solidFill>
+              </a:rPr>
+              <a:t>Overall</a:t>
             </a:r>
           </a:p>
         </p:txBody>

</xml_diff>